<commit_message>
Moved black and white to pin 8 and 9
</commit_message>
<xml_diff>
--- a/Box/Labels.pptx
+++ b/Box/Labels.pptx
@@ -5574,7 +5574,7 @@
         </p:nvSpPr>
         <p:spPr>
           <a:xfrm>
-            <a:off x="1817452" y="5649277"/>
+            <a:off x="1817452" y="3650379"/>
             <a:ext cx="205740" cy="197168"/>
           </a:xfrm>
           <a:prstGeom prst="ellipse">
@@ -5623,7 +5623,7 @@
         </p:nvSpPr>
         <p:spPr>
           <a:xfrm>
-            <a:off x="1817452" y="5395913"/>
+            <a:off x="1817452" y="3397015"/>
             <a:ext cx="205740" cy="197168"/>
           </a:xfrm>
           <a:prstGeom prst="ellipse">
@@ -6022,7 +6022,7 @@
         </p:nvCxnSpPr>
         <p:spPr>
           <a:xfrm flipH="1">
-            <a:off x="2023192" y="5494497"/>
+            <a:off x="2023192" y="3495599"/>
             <a:ext cx="288526" cy="0"/>
           </a:xfrm>
           <a:prstGeom prst="line">
@@ -6060,7 +6060,7 @@
         </p:nvCxnSpPr>
         <p:spPr>
           <a:xfrm flipH="1">
-            <a:off x="2023192" y="5747861"/>
+            <a:off x="2023192" y="3748963"/>
             <a:ext cx="288526" cy="0"/>
           </a:xfrm>
           <a:prstGeom prst="line">
@@ -6110,7 +6110,7 @@
         </p:blipFill>
         <p:spPr>
           <a:xfrm rot="5400000">
-            <a:off x="1031646" y="3636623"/>
+            <a:off x="1126238" y="2373526"/>
             <a:ext cx="710308" cy="672119"/>
           </a:xfrm>
           <a:prstGeom prst="rect">
@@ -6134,7 +6134,7 @@
         </p:nvCxnSpPr>
         <p:spPr>
           <a:xfrm flipV="1">
-            <a:off x="1722860" y="3972682"/>
+            <a:off x="1817452" y="2709585"/>
             <a:ext cx="588858" cy="1"/>
           </a:xfrm>
           <a:prstGeom prst="line">
@@ -6170,7 +6170,7 @@
         </p:nvSpPr>
         <p:spPr>
           <a:xfrm rot="16200000">
-            <a:off x="1066889" y="4754584"/>
+            <a:off x="1078756" y="3975777"/>
             <a:ext cx="913327" cy="369332"/>
           </a:xfrm>
           <a:prstGeom prst="rect">

</xml_diff>